<commit_message>
Added SQL Commands PPT file
</commit_message>
<xml_diff>
--- a/R23EF069_SQL_COMMANDS.pptx
+++ b/R23EF069_SQL_COMMANDS.pptx
@@ -25687,18 +25687,18 @@
 </file>
 
 <file path=customXml/item1.xml><?xml version="1.0" encoding="utf-8"?>
+<p:properties xmlns:p="http://schemas.microsoft.com/office/2006/metadata/properties" xmlns:xsi="http://www.w3.org/2001/XMLSchema-instance" xmlns:pc="http://schemas.microsoft.com/office/infopath/2007/PartnerControls">
+  <documentManagement/>
+</p:properties>
+</file>
+
+<file path=customXml/item2.xml><?xml version="1.0" encoding="utf-8"?>
 <?mso-contentType ?>
 <FormTemplates xmlns="http://schemas.microsoft.com/sharepoint/v3/contenttype/forms">
   <Display>DocumentLibraryForm</Display>
   <Edit>DocumentLibraryForm</Edit>
   <New>DocumentLibraryForm</New>
 </FormTemplates>
-</file>
-
-<file path=customXml/item2.xml><?xml version="1.0" encoding="utf-8"?>
-<p:properties xmlns:p="http://schemas.microsoft.com/office/2006/metadata/properties" xmlns:xsi="http://www.w3.org/2001/XMLSchema-instance" xmlns:pc="http://schemas.microsoft.com/office/infopath/2007/PartnerControls">
-  <documentManagement/>
-</p:properties>
 </file>
 
 <file path=customXml/item3.xml><?xml version="1.0" encoding="utf-8"?>
@@ -25816,18 +25816,18 @@
 </file>
 
 <file path=customXml/itemProps1.xml><?xml version="1.0" encoding="utf-8"?>
-<ds:datastoreItem xmlns:ds="http://schemas.openxmlformats.org/officeDocument/2006/customXml" ds:itemID="{F9AE24FE-195A-4977-9740-21B0E7B6E428}">
+<ds:datastoreItem xmlns:ds="http://schemas.openxmlformats.org/officeDocument/2006/customXml" ds:itemID="{D57E7970-383A-4553-B548-3EB18B7B93E8}">
   <ds:schemaRefs>
-    <ds:schemaRef ds:uri="http://schemas.microsoft.com/sharepoint/v3/contenttype/forms"/>
+    <ds:schemaRef ds:uri="http://schemas.microsoft.com/office/2006/metadata/properties"/>
+    <ds:schemaRef ds:uri="http://schemas.microsoft.com/office/infopath/2007/PartnerControls"/>
   </ds:schemaRefs>
 </ds:datastoreItem>
 </file>
 
 <file path=customXml/itemProps2.xml><?xml version="1.0" encoding="utf-8"?>
-<ds:datastoreItem xmlns:ds="http://schemas.openxmlformats.org/officeDocument/2006/customXml" ds:itemID="{D57E7970-383A-4553-B548-3EB18B7B93E8}">
+<ds:datastoreItem xmlns:ds="http://schemas.openxmlformats.org/officeDocument/2006/customXml" ds:itemID="{F9AE24FE-195A-4977-9740-21B0E7B6E428}">
   <ds:schemaRefs>
-    <ds:schemaRef ds:uri="http://schemas.microsoft.com/office/2006/metadata/properties"/>
-    <ds:schemaRef ds:uri="http://schemas.microsoft.com/office/infopath/2007/PartnerControls"/>
+    <ds:schemaRef ds:uri="http://schemas.microsoft.com/sharepoint/v3/contenttype/forms"/>
   </ds:schemaRefs>
 </ds:datastoreItem>
 </file>

</xml_diff>